<commit_message>
automatizado todo o roteiro
</commit_message>
<xml_diff>
--- a/Slides/auto_apresentacao.pptx
+++ b/Slides/auto_apresentacao.pptx
@@ -3188,7 +3188,21 @@
         <p:txBody>
           <a:bodyPr/>
           <a:lstStyle/>
-          <a:p/>
+          <a:p>
+            <a:r>
+              <a:t>Breve descrição da IA</a:t>
+            </a:r>
+          </a:p>
+          <a:p>
+            <a:r>
+              <a:t>Exemplos de aplicações da IA (assistente virtual, carros autônomos, reconhecimento facial, etc.)</a:t>
+            </a:r>
+          </a:p>
+          <a:p>
+            <a:r>
+              <a:t>Citação sobre a importância da IA na atualidade</a:t>
+            </a:r>
+          </a:p>
         </p:txBody>
       </p:sp>
     </p:spTree>
@@ -3244,9 +3258,55 @@
         <p:txBody>
           <a:bodyPr/>
           <a:lstStyle/>
-          <a:p/>
-        </p:txBody>
-      </p:sp>
+          <a:p>
+            <a:r>
+              <a:t>Explicação básica do funcionamento da IA:</a:t>
+            </a:r>
+          </a:p>
+          <a:p>
+            <a:pPr lvl="1"/>
+            <a:r>
+              <a:t>Redes neurais artificiais</a:t>
+            </a:r>
+          </a:p>
+          <a:p>
+            <a:pPr lvl="1"/>
+            <a:r>
+              <a:t>Algoritmos de aprendizado de máquina</a:t>
+            </a:r>
+          </a:p>
+          <a:p>
+            <a:pPr lvl="1"/>
+            <a:r>
+              <a:t>Processamento de dados</a:t>
+            </a:r>
+          </a:p>
+        </p:txBody>
+      </p:sp>
+      <p:pic>
+        <p:nvPicPr>
+          <p:cNvPr id="4" name="Picture 3" descr="ia.jpg"/>
+          <p:cNvPicPr>
+            <a:picLocks noChangeAspect="1"/>
+          </p:cNvPicPr>
+          <p:nvPr/>
+        </p:nvPicPr>
+        <p:blipFill>
+          <a:blip r:embed="rId2"/>
+          <a:stretch>
+            <a:fillRect/>
+          </a:stretch>
+        </p:blipFill>
+        <p:spPr>
+          <a:xfrm>
+            <a:off x="2743200" y="4114800"/>
+            <a:ext cx="3810000" cy="2120900"/>
+          </a:xfrm>
+          <a:prstGeom prst="rect">
+            <a:avLst/>
+          </a:prstGeom>
+        </p:spPr>
+      </p:pic>
     </p:spTree>
   </p:cSld>
   <p:clrMapOvr>
@@ -3300,7 +3360,52 @@
         <p:txBody>
           <a:bodyPr/>
           <a:lstStyle/>
-          <a:p/>
+          <a:p>
+            <a:r>
+              <a:t>Listagem dos principais benefícios da IA:</a:t>
+            </a:r>
+          </a:p>
+          <a:p>
+            <a:pPr lvl="1"/>
+            <a:r>
+              <a:t>Automação de tarefas</a:t>
+            </a:r>
+          </a:p>
+          <a:p>
+            <a:pPr lvl="1"/>
+            <a:r>
+              <a:t>Melhoria da eficiência</a:t>
+            </a:r>
+          </a:p>
+          <a:p>
+            <a:pPr lvl="1"/>
+            <a:r>
+              <a:t>Previsões precisas</a:t>
+            </a:r>
+          </a:p>
+          <a:p>
+            <a:r>
+              <a:t>Destaque para os desafios:</a:t>
+            </a:r>
+          </a:p>
+          <a:p>
+            <a:pPr lvl="1"/>
+            <a:r>
+              <a:t>Privacidade</a:t>
+            </a:r>
+          </a:p>
+          <a:p>
+            <a:pPr lvl="1"/>
+            <a:r>
+              <a:t>Ética</a:t>
+            </a:r>
+          </a:p>
+          <a:p>
+            <a:pPr lvl="1"/>
+            <a:r>
+              <a:t>Impactos no mercado de trabalho</a:t>
+            </a:r>
+          </a:p>
         </p:txBody>
       </p:sp>
     </p:spTree>
@@ -3356,7 +3461,29 @@
         <p:txBody>
           <a:bodyPr/>
           <a:lstStyle/>
-          <a:p/>
+          <a:p>
+            <a:r>
+              <a:t>Perspectivas para o futuro da IA:</a:t>
+            </a:r>
+          </a:p>
+          <a:p>
+            <a:pPr lvl="1"/>
+            <a:r>
+              <a:t>Avanços tecnológicos</a:t>
+            </a:r>
+          </a:p>
+          <a:p>
+            <a:pPr lvl="1"/>
+            <a:r>
+              <a:t>Aplicações em áreas diversas</a:t>
+            </a:r>
+          </a:p>
+          <a:p>
+            <a:pPr lvl="1"/>
+            <a:r>
+              <a:t>Impacto na sociedade e economia</a:t>
+            </a:r>
+          </a:p>
         </p:txBody>
       </p:sp>
     </p:spTree>
@@ -3412,7 +3539,21 @@
         <p:txBody>
           <a:bodyPr/>
           <a:lstStyle/>
-          <a:p/>
+          <a:p>
+            <a:r>
+              <a:t>Recapitulação dos pontos-chave abordados</a:t>
+            </a:r>
+          </a:p>
+          <a:p>
+            <a:r>
+              <a:t>Ênfase na importância e impacto da IA em nosso cotidiano</a:t>
+            </a:r>
+          </a:p>
+          <a:p>
+            <a:r>
+              <a:t>Convite para perguntas e discussões sobre o tema</a:t>
+            </a:r>
+          </a:p>
         </p:txBody>
       </p:sp>
     </p:spTree>

</xml_diff>